<commit_message>
Update 08 - Abstract Syntax Trees.pptx
</commit_message>
<xml_diff>
--- a/PowerPoints/08 - Abstract Syntax Trees.pptx
+++ b/PowerPoints/08 - Abstract Syntax Trees.pptx
@@ -16164,37 +16164,25 @@
               <a:rPr lang="en-US" sz="1800" dirty="0" err="1">
                 <a:latin typeface="Consolas" panose="020B0609020204030204" pitchFamily="49" charset="0"/>
               </a:rPr>
-              <a:t>SingleVarDecl</a:t>
-            </a:r>
-            <a:r>
-              <a:rPr lang="en-US" sz="1800" dirty="0">
-                <a:latin typeface="Consolas" panose="020B0609020204030204" pitchFamily="49" charset="0"/>
-              </a:rPr>
-              <a:t> </a:t>
+              <a:t>decl</a:t>
+            </a:r>
+            <a:r>
+              <a:rPr lang="en-US" sz="1800" dirty="0">
+                <a:latin typeface="Consolas" panose="020B0609020204030204" pitchFamily="49" charset="0"/>
+              </a:rPr>
+              <a:t> in </a:t>
             </a:r>
             <a:r>
               <a:rPr lang="en-US" sz="1800" dirty="0" err="1">
                 <a:latin typeface="Consolas" panose="020B0609020204030204" pitchFamily="49" charset="0"/>
               </a:rPr>
-              <a:t>decl</a:t>
-            </a:r>
-            <a:r>
-              <a:rPr lang="en-US" sz="1800" dirty="0">
-                <a:latin typeface="Consolas" panose="020B0609020204030204" pitchFamily="49" charset="0"/>
-              </a:rPr>
-              <a:t> : </a:t>
-            </a:r>
-            <a:r>
-              <a:rPr lang="en-US" sz="1800" dirty="0" err="1">
-                <a:latin typeface="Consolas" panose="020B0609020204030204" pitchFamily="49" charset="0"/>
-              </a:rPr>
-              <a:t>varDecl.getSingleVarDecls</a:t>
-            </a:r>
-            <a:r>
-              <a:rPr lang="en-US" sz="1800" dirty="0">
-                <a:latin typeface="Consolas" panose="020B0609020204030204" pitchFamily="49" charset="0"/>
-              </a:rPr>
-              <a:t>())</a:t>
+              <a:t>varDecl.singleVarDecls</a:t>
+            </a:r>
+            <a:r>
+              <a:rPr lang="en-US" sz="1800" dirty="0">
+                <a:latin typeface="Consolas" panose="020B0609020204030204" pitchFamily="49" charset="0"/>
+              </a:rPr>
+              <a:t>)</a:t>
             </a:r>
           </a:p>
           <a:p>
@@ -16220,7 +16208,7 @@
               <a:rPr lang="en-US" sz="1800" dirty="0">
                 <a:latin typeface="Consolas" panose="020B0609020204030204" pitchFamily="49" charset="0"/>
               </a:rPr>
-              <a:t>);</a:t>
+              <a:t>)</a:t>
             </a:r>
           </a:p>
           <a:p>
@@ -25958,7 +25946,7 @@
           <a:p>
             <a:pPr marL="457200" lvl="1" indent="0">
               <a:spcBef>
-                <a:spcPts val="200"/>
+                <a:spcPts val="100"/>
               </a:spcBef>
               <a:buNone/>
             </a:pPr>
@@ -25972,7 +25960,7 @@
           <a:p>
             <a:pPr marL="457200" lvl="1" indent="0">
               <a:spcBef>
-                <a:spcPts val="200"/>
+                <a:spcPts val="100"/>
               </a:spcBef>
               <a:buNone/>
             </a:pPr>
@@ -25998,7 +25986,7 @@
           <a:p>
             <a:pPr marL="457200" lvl="1" indent="0">
               <a:spcBef>
-                <a:spcPts val="200"/>
+                <a:spcPts val="100"/>
               </a:spcBef>
               <a:buNone/>
             </a:pPr>
@@ -26009,7 +25997,7 @@
           <a:p>
             <a:pPr marL="457200" lvl="1" indent="0">
               <a:spcBef>
-                <a:spcPts val="200"/>
+                <a:spcPts val="100"/>
               </a:spcBef>
               <a:buNone/>
             </a:pPr>
@@ -26035,7 +26023,7 @@
           <a:p>
             <a:pPr marL="457200" lvl="1" indent="0">
               <a:spcBef>
-                <a:spcPts val="200"/>
+                <a:spcPts val="100"/>
               </a:spcBef>
               <a:buNone/>
             </a:pPr>
@@ -26049,7 +26037,7 @@
           <a:p>
             <a:pPr marL="457200" lvl="1" indent="0">
               <a:spcBef>
-                <a:spcPts val="200"/>
+                <a:spcPts val="100"/>
               </a:spcBef>
               <a:buNone/>
             </a:pPr>
@@ -26063,7 +26051,7 @@
           <a:p>
             <a:pPr marL="457200" lvl="1" indent="0">
               <a:spcBef>
-                <a:spcPts val="200"/>
+                <a:spcPts val="100"/>
               </a:spcBef>
               <a:buNone/>
             </a:pPr>
@@ -26110,7 +26098,7 @@
           <a:p>
             <a:pPr marL="457200" lvl="1" indent="0">
               <a:spcBef>
-                <a:spcPts val="200"/>
+                <a:spcPts val="100"/>
               </a:spcBef>
               <a:buNone/>
             </a:pPr>
@@ -26133,7 +26121,7 @@
           <a:p>
             <a:pPr marL="457200" lvl="1" indent="0">
               <a:spcBef>
-                <a:spcPts val="200"/>
+                <a:spcPts val="100"/>
               </a:spcBef>
               <a:buNone/>
             </a:pPr>
@@ -26147,7 +26135,7 @@
           <a:p>
             <a:pPr marL="457200" lvl="1" indent="0">
               <a:spcBef>
-                <a:spcPts val="200"/>
+                <a:spcPts val="100"/>
               </a:spcBef>
               <a:buNone/>
             </a:pPr>
@@ -26368,7 +26356,7 @@
           <a:p>
             <a:pPr marL="457200" lvl="1" indent="0">
               <a:spcBef>
-                <a:spcPts val="200"/>
+                <a:spcPts val="100"/>
               </a:spcBef>
               <a:buNone/>
             </a:pPr>
@@ -26376,7 +26364,7 @@
               <a:rPr lang="en-US" sz="1750" dirty="0">
                 <a:latin typeface="Consolas" panose="020B0609020204030204" pitchFamily="49" charset="0"/>
               </a:rPr>
-              <a:t>     else if (type is </a:t>
+              <a:t>    else if (type is </a:t>
             </a:r>
             <a:r>
               <a:rPr lang="en-US" sz="1750" dirty="0" err="1">
@@ -26394,7 +26382,7 @@
           <a:p>
             <a:pPr marL="457200" lvl="1" indent="0">
               <a:spcBef>
-                <a:spcPts val="200"/>
+                <a:spcPts val="100"/>
               </a:spcBef>
               <a:buNone/>
             </a:pPr>
@@ -26408,7 +26396,7 @@
           <a:p>
             <a:pPr marL="457200" lvl="1" indent="0">
               <a:spcBef>
-                <a:spcPts val="200"/>
+                <a:spcPts val="100"/>
               </a:spcBef>
               <a:buNone/>
             </a:pPr>
@@ -26422,7 +26410,7 @@
           <a:p>
             <a:pPr marL="457200" lvl="1" indent="0">
               <a:spcBef>
-                <a:spcPts val="200"/>
+                <a:spcPts val="100"/>
               </a:spcBef>
               <a:buNone/>
             </a:pPr>
@@ -26436,7 +26424,7 @@
           <a:p>
             <a:pPr marL="457200" lvl="1" indent="0">
               <a:spcBef>
-                <a:spcPts val="200"/>
+                <a:spcPts val="100"/>
               </a:spcBef>
               <a:buNone/>
             </a:pPr>
@@ -26445,35 +26433,12 @@
                 <a:latin typeface="Consolas" panose="020B0609020204030204" pitchFamily="49" charset="0"/>
               </a:rPr>
               <a:t>      }</a:t>
-            </a:r>
-          </a:p>
-          <a:p>
-            <a:pPr marL="457200" lvl="1" indent="0">
-              <a:buNone/>
-            </a:pPr>
-            <a:r>
-              <a:rPr lang="en-US" sz="1750" dirty="0">
-                <a:latin typeface="Consolas" panose="020B0609020204030204" pitchFamily="49" charset="0"/>
-              </a:rPr>
-              <a:t>    else if (type is </a:t>
-            </a:r>
-            <a:r>
-              <a:rPr lang="en-US" sz="1750" dirty="0" err="1">
-                <a:latin typeface="Consolas" panose="020B0609020204030204" pitchFamily="49" charset="0"/>
-              </a:rPr>
-              <a:t>StringType</a:t>
-            </a:r>
-            <a:r>
-              <a:rPr lang="en-US" sz="1750" dirty="0">
-                <a:latin typeface="Consolas" panose="020B0609020204030204" pitchFamily="49" charset="0"/>
-              </a:rPr>
-              <a:t>)</a:t>
             </a:r>
           </a:p>
           <a:p>
             <a:pPr marL="457200" lvl="1" indent="0">
               <a:spcBef>
-                <a:spcPts val="200"/>
+                <a:spcPts val="100"/>
               </a:spcBef>
               <a:buNone/>
             </a:pPr>
@@ -26481,13 +26446,25 @@
               <a:rPr lang="en-US" sz="1750" dirty="0">
                 <a:latin typeface="Consolas" panose="020B0609020204030204" pitchFamily="49" charset="0"/>
               </a:rPr>
-              <a:t>      {</a:t>
+              <a:t>    else if (type is </a:t>
+            </a:r>
+            <a:r>
+              <a:rPr lang="en-US" sz="1750" dirty="0" err="1">
+                <a:latin typeface="Consolas" panose="020B0609020204030204" pitchFamily="49" charset="0"/>
+              </a:rPr>
+              <a:t>StringType</a:t>
+            </a:r>
+            <a:r>
+              <a:rPr lang="en-US" sz="1750" dirty="0">
+                <a:latin typeface="Consolas" panose="020B0609020204030204" pitchFamily="49" charset="0"/>
+              </a:rPr>
+              <a:t>)</a:t>
             </a:r>
           </a:p>
           <a:p>
             <a:pPr marL="457200" lvl="1" indent="0">
               <a:spcBef>
-                <a:spcPts val="200"/>
+                <a:spcPts val="100"/>
               </a:spcBef>
               <a:buNone/>
             </a:pPr>
@@ -26495,13 +26472,13 @@
               <a:rPr lang="en-US" sz="1750" dirty="0">
                 <a:latin typeface="Consolas" panose="020B0609020204030204" pitchFamily="49" charset="0"/>
               </a:rPr>
-              <a:t>        // Selector can be field expression .length (Integer)</a:t>
+              <a:t>      {</a:t>
             </a:r>
           </a:p>
           <a:p>
             <a:pPr marL="457200" lvl="1" indent="0">
               <a:spcBef>
-                <a:spcPts val="200"/>
+                <a:spcPts val="100"/>
               </a:spcBef>
               <a:buNone/>
             </a:pPr>
@@ -26509,13 +26486,13 @@
               <a:rPr lang="en-US" sz="1750" dirty="0">
                 <a:latin typeface="Consolas" panose="020B0609020204030204" pitchFamily="49" charset="0"/>
               </a:rPr>
-              <a:t>        // or an index expression for the characters (Char).</a:t>
+              <a:t>        // Selector can be field expression .length (Integer)</a:t>
             </a:r>
           </a:p>
           <a:p>
             <a:pPr marL="457200" lvl="1" indent="0">
               <a:spcBef>
-                <a:spcPts val="200"/>
+                <a:spcPts val="100"/>
               </a:spcBef>
               <a:buNone/>
             </a:pPr>
@@ -26523,13 +26500,13 @@
               <a:rPr lang="en-US" sz="1750" dirty="0">
                 <a:latin typeface="Consolas" panose="020B0609020204030204" pitchFamily="49" charset="0"/>
               </a:rPr>
-              <a:t>        ...</a:t>
+              <a:t>        // or an index expression for the characters (Char).</a:t>
             </a:r>
           </a:p>
           <a:p>
             <a:pPr marL="457200" lvl="1" indent="0">
               <a:spcBef>
-                <a:spcPts val="200"/>
+                <a:spcPts val="100"/>
               </a:spcBef>
               <a:buNone/>
             </a:pPr>
@@ -26537,13 +26514,13 @@
               <a:rPr lang="en-US" sz="1750" dirty="0">
                 <a:latin typeface="Consolas" panose="020B0609020204030204" pitchFamily="49" charset="0"/>
               </a:rPr>
-              <a:t>      }</a:t>
+              <a:t>        ...</a:t>
             </a:r>
           </a:p>
           <a:p>
             <a:pPr marL="457200" lvl="1" indent="0">
               <a:spcBef>
-                <a:spcPts val="200"/>
+                <a:spcPts val="100"/>
               </a:spcBef>
               <a:buNone/>
             </a:pPr>
@@ -26551,13 +26528,13 @@
               <a:rPr lang="en-US" sz="1750" dirty="0">
                 <a:latin typeface="Consolas" panose="020B0609020204030204" pitchFamily="49" charset="0"/>
               </a:rPr>
-              <a:t>    else</a:t>
+              <a:t>      }</a:t>
             </a:r>
           </a:p>
           <a:p>
             <a:pPr marL="457200" lvl="1" indent="0">
               <a:spcBef>
-                <a:spcPts val="200"/>
+                <a:spcPts val="100"/>
               </a:spcBef>
               <a:buNone/>
             </a:pPr>
@@ -26565,13 +26542,13 @@
               <a:rPr lang="en-US" sz="1750" dirty="0">
                 <a:latin typeface="Consolas" panose="020B0609020204030204" pitchFamily="49" charset="0"/>
               </a:rPr>
-              <a:t>      {</a:t>
+              <a:t>    else</a:t>
             </a:r>
           </a:p>
           <a:p>
             <a:pPr marL="457200" lvl="1" indent="0">
               <a:spcBef>
-                <a:spcPts val="200"/>
+                <a:spcPts val="100"/>
               </a:spcBef>
               <a:buNone/>
             </a:pPr>
@@ -26579,37 +26556,13 @@
               <a:rPr lang="en-US" sz="1750" dirty="0">
                 <a:latin typeface="Consolas" panose="020B0609020204030204" pitchFamily="49" charset="0"/>
               </a:rPr>
-              <a:t>        </a:t>
-            </a:r>
-            <a:r>
-              <a:rPr lang="en-US" sz="1750" dirty="0" err="1">
-                <a:latin typeface="Consolas" panose="020B0609020204030204" pitchFamily="49" charset="0"/>
-              </a:rPr>
-              <a:t>val</a:t>
-            </a:r>
-            <a:r>
-              <a:rPr lang="en-US" sz="1750" dirty="0">
-                <a:latin typeface="Consolas" panose="020B0609020204030204" pitchFamily="49" charset="0"/>
-              </a:rPr>
-              <a:t> </a:t>
-            </a:r>
-            <a:r>
-              <a:rPr lang="en-US" sz="1750" dirty="0" err="1">
-                <a:latin typeface="Consolas" panose="020B0609020204030204" pitchFamily="49" charset="0"/>
-              </a:rPr>
-              <a:t>errorMsg</a:t>
-            </a:r>
-            <a:r>
-              <a:rPr lang="en-US" sz="1750" dirty="0">
-                <a:latin typeface="Consolas" panose="020B0609020204030204" pitchFamily="49" charset="0"/>
-              </a:rPr>
-              <a:t> = "Selector expression not allowed ..."</a:t>
+              <a:t>      {</a:t>
             </a:r>
           </a:p>
           <a:p>
             <a:pPr marL="457200" lvl="1" indent="0">
               <a:spcBef>
-                <a:spcPts val="200"/>
+                <a:spcPts val="100"/>
               </a:spcBef>
               <a:buNone/>
             </a:pPr>
@@ -26617,19 +26570,19 @@
               <a:rPr lang="en-US" sz="1750" dirty="0">
                 <a:latin typeface="Consolas" panose="020B0609020204030204" pitchFamily="49" charset="0"/>
               </a:rPr>
-              <a:t>        throw error(</a:t>
+              <a:t>        </a:t>
             </a:r>
             <a:r>
               <a:rPr lang="en-US" sz="1750" dirty="0" err="1">
                 <a:latin typeface="Consolas" panose="020B0609020204030204" pitchFamily="49" charset="0"/>
               </a:rPr>
-              <a:t>expr.position</a:t>
+              <a:t>val</a:t>
             </a:r>
             <a:r>
               <a:rPr lang="en-US" sz="1750" dirty="0">
                 <a:latin typeface="Consolas" panose="020B0609020204030204" pitchFamily="49" charset="0"/>
               </a:rPr>
-              <a:t>, </a:t>
+              <a:t> </a:t>
             </a:r>
             <a:r>
               <a:rPr lang="en-US" sz="1750" dirty="0" err="1">
@@ -26641,13 +26594,13 @@
               <a:rPr lang="en-US" sz="1750" dirty="0">
                 <a:latin typeface="Consolas" panose="020B0609020204030204" pitchFamily="49" charset="0"/>
               </a:rPr>
-              <a:t>)</a:t>
+              <a:t> = "Selector expression not allowed ..."</a:t>
             </a:r>
           </a:p>
           <a:p>
             <a:pPr marL="457200" lvl="1" indent="0">
               <a:spcBef>
-                <a:spcPts val="200"/>
+                <a:spcPts val="100"/>
               </a:spcBef>
               <a:buNone/>
             </a:pPr>
@@ -26655,7 +26608,59 @@
               <a:rPr lang="en-US" sz="1750" dirty="0">
                 <a:latin typeface="Consolas" panose="020B0609020204030204" pitchFamily="49" charset="0"/>
               </a:rPr>
+              <a:t>        throw error(</a:t>
+            </a:r>
+            <a:r>
+              <a:rPr lang="en-US" sz="1750" dirty="0" err="1">
+                <a:latin typeface="Consolas" panose="020B0609020204030204" pitchFamily="49" charset="0"/>
+              </a:rPr>
+              <a:t>expr.position</a:t>
+            </a:r>
+            <a:r>
+              <a:rPr lang="en-US" sz="1750" dirty="0">
+                <a:latin typeface="Consolas" panose="020B0609020204030204" pitchFamily="49" charset="0"/>
+              </a:rPr>
+              <a:t>, </a:t>
+            </a:r>
+            <a:r>
+              <a:rPr lang="en-US" sz="1750" dirty="0" err="1">
+                <a:latin typeface="Consolas" panose="020B0609020204030204" pitchFamily="49" charset="0"/>
+              </a:rPr>
+              <a:t>errorMsg</a:t>
+            </a:r>
+            <a:r>
+              <a:rPr lang="en-US" sz="1750" dirty="0">
+                <a:latin typeface="Consolas" panose="020B0609020204030204" pitchFamily="49" charset="0"/>
+              </a:rPr>
+              <a:t>)</a:t>
+            </a:r>
+          </a:p>
+          <a:p>
+            <a:pPr marL="457200" lvl="1" indent="0">
+              <a:spcBef>
+                <a:spcPts val="100"/>
+              </a:spcBef>
+              <a:buNone/>
+            </a:pPr>
+            <a:r>
+              <a:rPr lang="en-US" sz="1750" dirty="0">
+                <a:latin typeface="Consolas" panose="020B0609020204030204" pitchFamily="49" charset="0"/>
+              </a:rPr>
               <a:t>      }</a:t>
+            </a:r>
+          </a:p>
+          <a:p>
+            <a:pPr marL="457200" lvl="1" indent="0">
+              <a:spcBef>
+                <a:spcPts val="100"/>
+              </a:spcBef>
+              <a:buNone/>
+            </a:pPr>
+            <a:r>
+              <a:rPr lang="en-US" sz="1750" dirty="0">
+                <a:latin typeface="Consolas" panose="020B0609020204030204" pitchFamily="49" charset="0"/>
+              </a:rPr>
+              <a:t>  }</a:t>
             </a:r>
           </a:p>
           <a:p>

</xml_diff>